<commit_message>
Even more updates to the PowerPoint
</commit_message>
<xml_diff>
--- a/Deliverables/OwensloProjectFinalPresentationCSC486.pptx
+++ b/Deliverables/OwensloProjectFinalPresentationCSC486.pptx
@@ -13494,20 +13494,14 @@
               <a:rPr lang="da-DK" sz="2000" dirty="0">
                 <a:hlinkClick r:id="rId7"/>
               </a:rPr>
-              <a:t>https://www.nexusmods.com/newvegas/mods/68714</a:t>
+              <a:t>https://www.nexusmods.com/newvegas/mods</a:t>
             </a:r>
-            <a:endParaRPr lang="en-US" sz="2000" dirty="0"/>
-          </a:p>
-          <a:p>
             <a:r>
-              <a:rPr lang="en-US" sz="2000" dirty="0">
-                <a:hlinkClick r:id="rId8"/>
+              <a:rPr lang="da-DK" sz="2000">
+                <a:hlinkClick r:id="rId7"/>
               </a:rPr>
-              <a:t>https://knowyourmeme.com/photos/1809295-patrick-star</a:t>
+              <a:t>/68714</a:t>
             </a:r>
-            <a:endParaRPr lang="en-US" sz="2000" dirty="0"/>
-          </a:p>
-          <a:p>
             <a:endParaRPr lang="en-US" dirty="0"/>
           </a:p>
           <a:p>

</xml_diff>